<commit_message>
Ryonsteele/6267 keyvault deployment (#370)
* Add secure annotation to hide aoai service key in deployment params

* Add Keyvault implementation to replace certain IaC outputs

* Add script azcli login

---------

Co-authored-by: dayland <48474707+dayland@users.noreply.github.com>
</commit_message>
<xml_diff>
--- a/tests/test_data/test_example.pptx
+++ b/tests/test_data/test_example.pptx
@@ -105,6 +105,11 @@
       </a:defRPr>
     </a:lvl9pPr>
   </p:defaultTextStyle>
+  <p:extLst>
+    <p:ext uri="{EFAFB233-063F-42B5-8137-9DF3F51BA10A}">
+      <p15:sldGuideLst xmlns:p15="http://schemas.microsoft.com/office/powerpoint/2012/main"/>
+    </p:ext>
+  </p:extLst>
 </p:presentation>
 </file>
 
@@ -674,7 +679,7 @@
           <a:p>
             <a:fld id="{97BFF81C-1FCB-4DBA-8044-F1A0FCFD45A6}" type="datetime1">
               <a:rPr lang="en-US" smtClean="0"/>
-              <a:t>10/11/2023</a:t>
+              <a:t>11/29/2023</a:t>
             </a:fld>
             <a:endParaRPr lang="en-US" dirty="0"/>
           </a:p>
@@ -1353,7 +1358,7 @@
           <a:p>
             <a:fld id="{FB9092B3-2D87-4CDF-B84B-C46E5F5D31F7}" type="datetime1">
               <a:rPr lang="en-US" smtClean="0"/>
-              <a:t>10/11/2023</a:t>
+              <a:t>11/29/2023</a:t>
             </a:fld>
             <a:endParaRPr lang="en-US" dirty="0"/>
           </a:p>
@@ -2042,7 +2047,7 @@
           <a:p>
             <a:fld id="{3D769E57-47B1-47B0-B526-3153E4B1E729}" type="datetime1">
               <a:rPr lang="en-US" smtClean="0"/>
-              <a:t>10/11/2023</a:t>
+              <a:t>11/29/2023</a:t>
             </a:fld>
             <a:endParaRPr lang="en-US" dirty="0"/>
           </a:p>
@@ -2721,7 +2726,7 @@
           <a:p>
             <a:fld id="{5A87773D-8987-489A-A650-3D6F7D5C7C38}" type="datetime1">
               <a:rPr lang="en-US" smtClean="0"/>
-              <a:t>10/11/2023</a:t>
+              <a:t>11/29/2023</a:t>
             </a:fld>
             <a:endParaRPr lang="en-US" dirty="0"/>
           </a:p>
@@ -3476,7 +3481,7 @@
           <a:p>
             <a:fld id="{97E150C1-1D78-4D80-810D-E9E86F6E88AB}" type="datetime1">
               <a:rPr lang="en-US" smtClean="0"/>
-              <a:t>10/11/2023</a:t>
+              <a:t>11/29/2023</a:t>
             </a:fld>
             <a:endParaRPr lang="en-US" dirty="0"/>
           </a:p>
@@ -4223,7 +4228,7 @@
           <a:p>
             <a:fld id="{29E9CBD8-1588-4B6B-B74D-87480DDE94C0}" type="datetime1">
               <a:rPr lang="en-US" smtClean="0"/>
-              <a:t>10/11/2023</a:t>
+              <a:t>11/29/2023</a:t>
             </a:fld>
             <a:endParaRPr lang="en-US" dirty="0"/>
           </a:p>
@@ -5117,7 +5122,7 @@
           <a:p>
             <a:fld id="{AD794440-721C-4D75-BD4F-4CFB3D51CDCA}" type="datetime1">
               <a:rPr lang="en-US" smtClean="0"/>
-              <a:t>10/11/2023</a:t>
+              <a:t>11/29/2023</a:t>
             </a:fld>
             <a:endParaRPr lang="en-US" dirty="0"/>
           </a:p>
@@ -5738,7 +5743,7 @@
           <a:p>
             <a:fld id="{B2701A64-483B-4532-94FB-D8F90CB6DEE0}" type="datetime1">
               <a:rPr lang="en-US" smtClean="0"/>
-              <a:t>10/11/2023</a:t>
+              <a:t>11/29/2023</a:t>
             </a:fld>
             <a:endParaRPr lang="en-US" dirty="0"/>
           </a:p>
@@ -6330,7 +6335,7 @@
           <a:p>
             <a:fld id="{6F18FB39-20FB-4E2E-B861-45B709B9C3C5}" type="datetime1">
               <a:rPr lang="en-US" smtClean="0"/>
-              <a:t>10/11/2023</a:t>
+              <a:t>11/29/2023</a:t>
             </a:fld>
             <a:endParaRPr lang="en-US" dirty="0"/>
           </a:p>
@@ -7122,7 +7127,7 @@
           <a:p>
             <a:fld id="{AC48AC19-8BD6-476C-9770-8884373BCF00}" type="datetime1">
               <a:rPr lang="en-US" smtClean="0"/>
-              <a:t>10/11/2023</a:t>
+              <a:t>11/29/2023</a:t>
             </a:fld>
             <a:endParaRPr lang="en-US"/>
           </a:p>
@@ -7894,7 +7899,7 @@
           <a:p>
             <a:fld id="{F3F68C53-8AD1-4F09-9486-FB3406B99CFA}" type="datetime1">
               <a:rPr lang="en-US" smtClean="0"/>
-              <a:t>10/11/2023</a:t>
+              <a:t>11/29/2023</a:t>
             </a:fld>
             <a:endParaRPr lang="en-US" dirty="0"/>
           </a:p>
@@ -8205,7 +8210,7 @@
             <a:fld id="{BA543EDD-D0D2-447F-B24F-3717AF4B109D}" type="datetime1">
               <a:rPr lang="en-US" smtClean="0"/>
               <a:pPr/>
-              <a:t>10/11/2023</a:t>
+              <a:t>11/29/2023</a:t>
             </a:fld>
             <a:endParaRPr lang="en-US" dirty="0"/>
           </a:p>
@@ -11295,8 +11300,13 @@
           <a:p>
             <a:r>
               <a:rPr lang="en-US" dirty="0"/>
-              <a:t>Text paragraph in power point</a:t>
+              <a:t>Text paragraph in </a:t>
             </a:r>
+            <a:r>
+              <a:rPr lang="en-US"/>
+              <a:t>power point.</a:t>
+            </a:r>
+            <a:endParaRPr lang="en-US" dirty="0"/>
           </a:p>
         </p:txBody>
       </p:sp>

</xml_diff>